<commit_message>
Added SaaS Churn Prediction Project with A/B Test Analysis
</commit_message>
<xml_diff>
--- a/KhushbooMasih_GooglePay_Retention_Analytics_CaseStudy_July2025.pptx
+++ b/KhushbooMasih_GooglePay_Retention_Analytics_CaseStudy_July2025.pptx
@@ -107,6 +107,11 @@
       </a:defRPr>
     </a:lvl9pPr>
   </p:defaultTextStyle>
+  <p:extLst>
+    <p:ext uri="{EFAFB233-063F-42B5-8137-9DF3F51BA10A}">
+      <p15:sldGuideLst xmlns:p15="http://schemas.microsoft.com/office/powerpoint/2012/main"/>
+    </p:ext>
+  </p:extLst>
 </p:presentation>
 </file>
 
@@ -3342,8 +3347,8 @@
         </p:nvSpPr>
         <p:spPr>
           <a:xfrm>
-            <a:off x="174661" y="4686814"/>
-            <a:ext cx="6678202" cy="2031325"/>
+            <a:off x="154113" y="4535580"/>
+            <a:ext cx="6678202" cy="2308324"/>
           </a:xfrm>
           <a:prstGeom prst="rect">
             <a:avLst/>
@@ -3508,7 +3513,7 @@
               </a:rPr>
               <a:t>GitHub: </a:t>
             </a:r>
-            <a:br>
+            <a:r>
               <a:rPr lang="en-IN" dirty="0">
                 <a:solidFill>
                   <a:schemeClr val="bg1"/>
@@ -3516,8 +3521,26 @@
                 <a:latin typeface="Calibri" panose="020F0502020204030204" pitchFamily="34" charset="0"/>
                 <a:ea typeface="Calibri" panose="020F0502020204030204" pitchFamily="34" charset="0"/>
                 <a:cs typeface="Calibri" panose="020F0502020204030204" pitchFamily="34" charset="0"/>
-              </a:rPr>
-            </a:br>
+                <a:hlinkClick r:id="rId4">
+                  <a:extLst>
+                    <a:ext uri="{A12FA001-AC4F-418D-AE19-62706E023703}">
+                      <ahyp:hlinkClr xmlns:ahyp="http://schemas.microsoft.com/office/drawing/2018/hyperlinkcolor" val="tx"/>
+                    </a:ext>
+                  </a:extLst>
+                </a:hlinkClick>
+              </a:rPr>
+              <a:t>https://github.com/Khush505/google-pay-retention-case-study</a:t>
+            </a:r>
+            <a:endParaRPr lang="en-IN" dirty="0">
+              <a:solidFill>
+                <a:schemeClr val="bg1"/>
+              </a:solidFill>
+              <a:latin typeface="Calibri" panose="020F0502020204030204" pitchFamily="34" charset="0"/>
+              <a:ea typeface="Calibri" panose="020F0502020204030204" pitchFamily="34" charset="0"/>
+              <a:cs typeface="Calibri" panose="020F0502020204030204" pitchFamily="34" charset="0"/>
+            </a:endParaRPr>
+          </a:p>
+          <a:p>
             <a:r>
               <a:rPr lang="en-IN" dirty="0">
                 <a:solidFill>

</xml_diff>